<commit_message>
minor edits and fixed url
</commit_message>
<xml_diff>
--- a/assets/lectures/cbw/2020/mini/RNASeq_MiniLecture_02_01_Alignment.pptx
+++ b/assets/lectures/cbw/2020/mini/RNASeq_MiniLecture_02_01_Alignment.pptx
@@ -214,7 +214,7 @@
           <a:p>
             <a:fld id="{827BD9F9-8452-A342-BB1B-28ECF19E2CC5}" type="datetimeFigureOut">
               <a:rPr lang="en-US" smtClean="0"/>
-              <a:t>6/15/20</a:t>
+              <a:t>6/18/20</a:t>
             </a:fld>
             <a:endParaRPr lang="en-US"/>
           </a:p>
@@ -1790,64 +1790,6 @@
               <a:t>Note that if we searched for an 8-bp sequence in the global index, we would expect to find an average of ~48,000 matching locations in the human genome (and sometimes many more). Instead of examining 48,000 possible locations, we use one of the local FM indexes, which is expected to contain just one copy of a given 8-bp sequence, on average. This two-stage hierarchical indexing allows us to avoid examining tens of thousands of candidate locations for short anchors, which in turn dramatically speeds up the overall alignment algorithm.</a:t>
             </a:r>
           </a:p>
-          <a:p>
-            <a:endParaRPr lang="en-US" dirty="0"/>
-          </a:p>
-          <a:p>
-            <a:r>
-              <a:rPr lang="en-US" dirty="0"/>
-              <a:t>The third read has long anchors (50 </a:t>
-            </a:r>
-            <a:r>
-              <a:rPr lang="en-US" dirty="0" err="1"/>
-              <a:t>bp</a:t>
-            </a:r>
-            <a:r>
-              <a:rPr lang="en-US" dirty="0"/>
-              <a:t> each) in each exon. We first align the read beginning on the right, using global search as we did before. After the first 28 </a:t>
-            </a:r>
-            <a:r>
-              <a:rPr lang="en-US" dirty="0" err="1"/>
-              <a:t>bp</a:t>
-            </a:r>
-            <a:r>
-              <a:rPr lang="en-US" dirty="0"/>
-              <a:t> is uniquely mapped, we switch to the extension operation, which further aligns 22 </a:t>
-            </a:r>
-            <a:r>
-              <a:rPr lang="en-US" dirty="0" err="1"/>
-              <a:t>bp</a:t>
-            </a:r>
-            <a:r>
-              <a:rPr lang="en-US" dirty="0"/>
-              <a:t> and stops after a mismatch at the 51st base. We then choose a local FM index and perform a local search using the first 8 </a:t>
-            </a:r>
-            <a:r>
-              <a:rPr lang="en-US" dirty="0" err="1"/>
-              <a:t>bp</a:t>
-            </a:r>
-            <a:r>
-              <a:rPr lang="en-US" dirty="0"/>
-              <a:t> of the remaining part of the read. Once this 8 </a:t>
-            </a:r>
-            <a:r>
-              <a:rPr lang="en-US" dirty="0" err="1"/>
-              <a:t>bp</a:t>
-            </a:r>
-            <a:r>
-              <a:rPr lang="en-US" dirty="0"/>
-              <a:t> is found, HISAT again uses the extension operation to align the rest of the read (Supplementary Fig. 8c). Note that if the 8-bp prefix mapped to too many locations, HISAT would use a longer prefix to reduce the number of potential locations to 5 or fewer.</a:t>
-            </a:r>
-          </a:p>
-          <a:p>
-            <a:endParaRPr lang="en-US" dirty="0"/>
-          </a:p>
-          <a:p>
-            <a:r>
-              <a:rPr lang="en-US" dirty="0"/>
-              <a:t>As we can see from these examples, we can combine global search, local search and directed read extension to achieve rapid yet sensitive alignment. Note that when a read has multiple spliced alignments, HISAT prefers to report alignments that use the canonical GT and AG dinucleotides on the ends of the intron. From any remaining alignments after this filter, it reports the one with the shortest intron length. HISAT provides several parameters with which users can customize its alignment strategy, including adjustable penalties for mismatches, indels and noncanonical splice sites (Supplementary Note).</a:t>
-            </a:r>
-          </a:p>
         </p:txBody>
       </p:sp>
       <p:sp>
@@ -4780,14 +4722,14 @@
           </a:ln>
           <a:extLst>
             <a:ext uri="{909E8E84-426E-40dd-AFC4-6F175D3DCCD1}">
-              <a14:hiddenFill xmlns:a14="http://schemas.microsoft.com/office/drawing/2010/main" xmlns="">
+              <a14:hiddenFill xmlns="" xmlns:a14="http://schemas.microsoft.com/office/drawing/2010/main">
                 <a:solidFill>
                   <a:srgbClr val="FFFFFF"/>
                 </a:solidFill>
               </a14:hiddenFill>
             </a:ext>
             <a:ext uri="{91240B29-F687-4f45-9708-019B960494DF}">
-              <a14:hiddenLine xmlns:a14="http://schemas.microsoft.com/office/drawing/2010/main" xmlns="" w="9525">
+              <a14:hiddenLine xmlns="" xmlns:a14="http://schemas.microsoft.com/office/drawing/2010/main" w="9525">
                 <a:solidFill>
                   <a:srgbClr val="000000"/>
                 </a:solidFill>
@@ -5947,14 +5889,14 @@
           </a:ln>
           <a:extLst>
             <a:ext uri="{909E8E84-426E-40dd-AFC4-6F175D3DCCD1}">
-              <a14:hiddenFill xmlns="" xmlns:a14="http://schemas.microsoft.com/office/drawing/2010/main">
+              <a14:hiddenFill xmlns:a14="http://schemas.microsoft.com/office/drawing/2010/main" xmlns="">
                 <a:solidFill>
                   <a:srgbClr val="FFFFFF"/>
                 </a:solidFill>
               </a14:hiddenFill>
             </a:ext>
             <a:ext uri="{91240B29-F687-4f45-9708-019B960494DF}">
-              <a14:hiddenLine xmlns="" xmlns:a14="http://schemas.microsoft.com/office/drawing/2010/main" w="9525">
+              <a14:hiddenLine xmlns:a14="http://schemas.microsoft.com/office/drawing/2010/main" xmlns="" w="9525">
                 <a:solidFill>
                   <a:srgbClr val="000000"/>
                 </a:solidFill>
@@ -6620,14 +6562,14 @@
           </a:ln>
           <a:extLst>
             <a:ext uri="{909E8E84-426E-40dd-AFC4-6F175D3DCCD1}">
-              <a14:hiddenFill xmlns="" xmlns:a14="http://schemas.microsoft.com/office/drawing/2010/main">
+              <a14:hiddenFill xmlns:a14="http://schemas.microsoft.com/office/drawing/2010/main" xmlns="">
                 <a:solidFill>
                   <a:srgbClr val="FFFFFF"/>
                 </a:solidFill>
               </a14:hiddenFill>
             </a:ext>
             <a:ext uri="{91240B29-F687-4f45-9708-019B960494DF}">
-              <a14:hiddenLine xmlns="" xmlns:a14="http://schemas.microsoft.com/office/drawing/2010/main" w="9525">
+              <a14:hiddenLine xmlns:a14="http://schemas.microsoft.com/office/drawing/2010/main" xmlns="" w="9525">
                 <a:solidFill>
                   <a:srgbClr val="000000"/>
                 </a:solidFill>
@@ -7039,14 +6981,14 @@
           </a:ln>
           <a:extLst>
             <a:ext uri="{909E8E84-426E-40dd-AFC4-6F175D3DCCD1}">
-              <a14:hiddenFill xmlns="" xmlns:a14="http://schemas.microsoft.com/office/drawing/2010/main">
+              <a14:hiddenFill xmlns:a14="http://schemas.microsoft.com/office/drawing/2010/main" xmlns="">
                 <a:solidFill>
                   <a:srgbClr val="FFFFFF"/>
                 </a:solidFill>
               </a14:hiddenFill>
             </a:ext>
             <a:ext uri="{91240B29-F687-4f45-9708-019B960494DF}">
-              <a14:hiddenLine xmlns="" xmlns:a14="http://schemas.microsoft.com/office/drawing/2010/main" w="9525">
+              <a14:hiddenLine xmlns:a14="http://schemas.microsoft.com/office/drawing/2010/main" xmlns="" w="9525">
                 <a:solidFill>
                   <a:srgbClr val="000000"/>
                 </a:solidFill>
@@ -7518,14 +7460,14 @@
           </a:ln>
           <a:extLst>
             <a:ext uri="{909E8E84-426E-40dd-AFC4-6F175D3DCCD1}">
-              <a14:hiddenFill xmlns="" xmlns:a14="http://schemas.microsoft.com/office/drawing/2010/main">
+              <a14:hiddenFill xmlns:a14="http://schemas.microsoft.com/office/drawing/2010/main" xmlns="">
                 <a:solidFill>
                   <a:srgbClr val="FFFFFF"/>
                 </a:solidFill>
               </a14:hiddenFill>
             </a:ext>
             <a:ext uri="{91240B29-F687-4f45-9708-019B960494DF}">
-              <a14:hiddenLine xmlns="" xmlns:a14="http://schemas.microsoft.com/office/drawing/2010/main" w="9525">
+              <a14:hiddenLine xmlns:a14="http://schemas.microsoft.com/office/drawing/2010/main" xmlns="" w="9525">
                 <a:solidFill>
                   <a:srgbClr val="000000"/>
                 </a:solidFill>
@@ -7987,14 +7929,14 @@
           </a:ln>
           <a:extLst>
             <a:ext uri="{909E8E84-426E-40dd-AFC4-6F175D3DCCD1}">
-              <a14:hiddenFill xmlns="" xmlns:a14="http://schemas.microsoft.com/office/drawing/2010/main">
+              <a14:hiddenFill xmlns:a14="http://schemas.microsoft.com/office/drawing/2010/main" xmlns="">
                 <a:solidFill>
                   <a:srgbClr val="FFFFFF"/>
                 </a:solidFill>
               </a14:hiddenFill>
             </a:ext>
             <a:ext uri="{91240B29-F687-4f45-9708-019B960494DF}">
-              <a14:hiddenLine xmlns="" xmlns:a14="http://schemas.microsoft.com/office/drawing/2010/main" w="9525">
+              <a14:hiddenLine xmlns:a14="http://schemas.microsoft.com/office/drawing/2010/main" xmlns="" w="9525">
                 <a:solidFill>
                   <a:srgbClr val="000000"/>
                 </a:solidFill>
@@ -8168,7 +8110,7 @@
 </file>
 
 <file path=ppt/slides/slide16.xml><?xml version="1.0" encoding="utf-8"?>
-<p:sld xmlns:a="http://schemas.openxmlformats.org/drawingml/2006/main" xmlns:r="http://schemas.openxmlformats.org/officeDocument/2006/relationships" xmlns:p="http://schemas.openxmlformats.org/presentationml/2006/main">
+<p:sld xmlns:a="http://schemas.openxmlformats.org/drawingml/2006/main" xmlns:r="http://schemas.openxmlformats.org/officeDocument/2006/relationships" xmlns:p="http://schemas.openxmlformats.org/presentationml/2006/main" show="0">
   <p:cSld>
     <p:spTree>
       <p:nvGrpSpPr>
@@ -9259,14 +9201,14 @@
           </a:ln>
           <a:extLst>
             <a:ext uri="{909E8E84-426E-40dd-AFC4-6F175D3DCCD1}">
-              <a14:hiddenFill xmlns:a14="http://schemas.microsoft.com/office/drawing/2010/main" xmlns="">
+              <a14:hiddenFill xmlns="" xmlns:a14="http://schemas.microsoft.com/office/drawing/2010/main">
                 <a:solidFill>
                   <a:srgbClr val="FFFFFF"/>
                 </a:solidFill>
               </a14:hiddenFill>
             </a:ext>
             <a:ext uri="{91240B29-F687-4f45-9708-019B960494DF}">
-              <a14:hiddenLine xmlns:a14="http://schemas.microsoft.com/office/drawing/2010/main" xmlns="" w="9525">
+              <a14:hiddenLine xmlns="" xmlns:a14="http://schemas.microsoft.com/office/drawing/2010/main" w="9525">
                 <a:solidFill>
                   <a:srgbClr val="000000"/>
                 </a:solidFill>
@@ -10066,14 +10008,14 @@
           </a:ln>
           <a:extLst>
             <a:ext uri="{909E8E84-426E-40dd-AFC4-6F175D3DCCD1}">
-              <a14:hiddenFill xmlns="" xmlns:a14="http://schemas.microsoft.com/office/drawing/2010/main">
+              <a14:hiddenFill xmlns:a14="http://schemas.microsoft.com/office/drawing/2010/main" xmlns="">
                 <a:solidFill>
                   <a:srgbClr val="FFFFFF"/>
                 </a:solidFill>
               </a14:hiddenFill>
             </a:ext>
             <a:ext uri="{91240B29-F687-4f45-9708-019B960494DF}">
-              <a14:hiddenLine xmlns="" xmlns:a14="http://schemas.microsoft.com/office/drawing/2010/main" w="9525">
+              <a14:hiddenLine xmlns:a14="http://schemas.microsoft.com/office/drawing/2010/main" xmlns="" w="9525">
                 <a:solidFill>
                   <a:srgbClr val="000000"/>
                 </a:solidFill>
@@ -10083,7 +10025,7 @@
               </a14:hiddenLine>
             </a:ext>
             <a:ext uri="{FAA26D3D-D897-4be2-8F04-BA451C77F1D7}">
-              <ma14:placeholderFlag xmlns="" xmlns:ma14="http://schemas.microsoft.com/office/mac/drawingml/2011/main" val="1"/>
+              <ma14:placeholderFlag xmlns:ma14="http://schemas.microsoft.com/office/mac/drawingml/2011/main" xmlns="" val="1"/>
             </a:ext>
           </a:extLst>
         </p:spPr>
@@ -10123,14 +10065,14 @@
           </a:ln>
           <a:extLst>
             <a:ext uri="{909E8E84-426E-40dd-AFC4-6F175D3DCCD1}">
-              <a14:hiddenFill xmlns="" xmlns:a14="http://schemas.microsoft.com/office/drawing/2010/main">
+              <a14:hiddenFill xmlns:a14="http://schemas.microsoft.com/office/drawing/2010/main" xmlns="">
                 <a:solidFill>
                   <a:srgbClr val="FFFFFF"/>
                 </a:solidFill>
               </a14:hiddenFill>
             </a:ext>
             <a:ext uri="{91240B29-F687-4f45-9708-019B960494DF}">
-              <a14:hiddenLine xmlns="" xmlns:a14="http://schemas.microsoft.com/office/drawing/2010/main" w="9525">
+              <a14:hiddenLine xmlns:a14="http://schemas.microsoft.com/office/drawing/2010/main" xmlns="" w="9525">
                 <a:solidFill>
                   <a:srgbClr val="000000"/>
                 </a:solidFill>
@@ -10140,7 +10082,7 @@
               </a14:hiddenLine>
             </a:ext>
             <a:ext uri="{FAA26D3D-D897-4be2-8F04-BA451C77F1D7}">
-              <ma14:placeholderFlag xmlns="" xmlns:ma14="http://schemas.microsoft.com/office/mac/drawingml/2011/main" val="1"/>
+              <ma14:placeholderFlag xmlns:ma14="http://schemas.microsoft.com/office/mac/drawingml/2011/main" xmlns="" val="1"/>
             </a:ext>
           </a:extLst>
         </p:spPr>
@@ -10167,14 +10109,14 @@
           </a:ln>
           <a:extLst>
             <a:ext uri="{909E8E84-426E-40dd-AFC4-6F175D3DCCD1}">
-              <a14:hiddenFill xmlns="" xmlns:a14="http://schemas.microsoft.com/office/drawing/2010/main">
+              <a14:hiddenFill xmlns:a14="http://schemas.microsoft.com/office/drawing/2010/main" xmlns="">
                 <a:solidFill>
                   <a:srgbClr val="FFFFFF"/>
                 </a:solidFill>
               </a14:hiddenFill>
             </a:ext>
             <a:ext uri="{91240B29-F687-4f45-9708-019B960494DF}">
-              <a14:hiddenLine xmlns="" xmlns:a14="http://schemas.microsoft.com/office/drawing/2010/main" w="9525">
+              <a14:hiddenLine xmlns:a14="http://schemas.microsoft.com/office/drawing/2010/main" xmlns="" w="9525">
                 <a:solidFill>
                   <a:srgbClr val="000000"/>
                 </a:solidFill>
@@ -10356,14 +10298,14 @@
           </a:ln>
           <a:extLst>
             <a:ext uri="{909E8E84-426E-40dd-AFC4-6F175D3DCCD1}">
-              <a14:hiddenFill xmlns="" xmlns:a14="http://schemas.microsoft.com/office/drawing/2010/main">
+              <a14:hiddenFill xmlns:a14="http://schemas.microsoft.com/office/drawing/2010/main" xmlns="">
                 <a:solidFill>
                   <a:srgbClr val="FFFFFF"/>
                 </a:solidFill>
               </a14:hiddenFill>
             </a:ext>
             <a:ext uri="{91240B29-F687-4f45-9708-019B960494DF}">
-              <a14:hiddenLine xmlns="" xmlns:a14="http://schemas.microsoft.com/office/drawing/2010/main" w="9525">
+              <a14:hiddenLine xmlns:a14="http://schemas.microsoft.com/office/drawing/2010/main" xmlns="" w="9525">
                 <a:solidFill>
                   <a:srgbClr val="000000"/>
                 </a:solidFill>
@@ -10545,14 +10487,14 @@
           </a:ln>
           <a:extLst>
             <a:ext uri="{909E8E84-426E-40dd-AFC4-6F175D3DCCD1}">
-              <a14:hiddenFill xmlns="" xmlns:a14="http://schemas.microsoft.com/office/drawing/2010/main">
+              <a14:hiddenFill xmlns:a14="http://schemas.microsoft.com/office/drawing/2010/main" xmlns="">
                 <a:solidFill>
                   <a:srgbClr val="FFFFFF"/>
                 </a:solidFill>
               </a14:hiddenFill>
             </a:ext>
             <a:ext uri="{91240B29-F687-4f45-9708-019B960494DF}">
-              <a14:hiddenLine xmlns="" xmlns:a14="http://schemas.microsoft.com/office/drawing/2010/main" w="9525">
+              <a14:hiddenLine xmlns:a14="http://schemas.microsoft.com/office/drawing/2010/main" xmlns="" w="9525">
                 <a:solidFill>
                   <a:srgbClr val="000000"/>
                 </a:solidFill>
@@ -10734,14 +10676,14 @@
           </a:ln>
           <a:extLst>
             <a:ext uri="{909E8E84-426E-40dd-AFC4-6F175D3DCCD1}">
-              <a14:hiddenFill xmlns="" xmlns:a14="http://schemas.microsoft.com/office/drawing/2010/main">
+              <a14:hiddenFill xmlns:a14="http://schemas.microsoft.com/office/drawing/2010/main" xmlns="">
                 <a:solidFill>
                   <a:srgbClr val="FFFFFF"/>
                 </a:solidFill>
               </a14:hiddenFill>
             </a:ext>
             <a:ext uri="{91240B29-F687-4f45-9708-019B960494DF}">
-              <a14:hiddenLine xmlns="" xmlns:a14="http://schemas.microsoft.com/office/drawing/2010/main" w="9525">
+              <a14:hiddenLine xmlns:a14="http://schemas.microsoft.com/office/drawing/2010/main" xmlns="" w="9525">
                 <a:solidFill>
                   <a:srgbClr val="000000"/>
                 </a:solidFill>
@@ -11247,14 +11189,14 @@
           </a:ln>
           <a:extLst>
             <a:ext uri="{909E8E84-426E-40dd-AFC4-6F175D3DCCD1}">
-              <a14:hiddenFill xmlns="" xmlns:a14="http://schemas.microsoft.com/office/drawing/2010/main">
+              <a14:hiddenFill xmlns:a14="http://schemas.microsoft.com/office/drawing/2010/main" xmlns="">
                 <a:solidFill>
                   <a:srgbClr val="FFFFFF"/>
                 </a:solidFill>
               </a14:hiddenFill>
             </a:ext>
             <a:ext uri="{91240B29-F687-4f45-9708-019B960494DF}">
-              <a14:hiddenLine xmlns="" xmlns:a14="http://schemas.microsoft.com/office/drawing/2010/main" w="9525">
+              <a14:hiddenLine xmlns:a14="http://schemas.microsoft.com/office/drawing/2010/main" xmlns="" w="9525">
                 <a:solidFill>
                   <a:srgbClr val="000000"/>
                 </a:solidFill>
@@ -11823,14 +11765,14 @@
           </a:ln>
           <a:extLst>
             <a:ext uri="{909E8E84-426E-40dd-AFC4-6F175D3DCCD1}">
-              <a14:hiddenFill xmlns="" xmlns:a14="http://schemas.microsoft.com/office/drawing/2010/main">
+              <a14:hiddenFill xmlns:a14="http://schemas.microsoft.com/office/drawing/2010/main" xmlns="">
                 <a:solidFill>
                   <a:srgbClr val="FFFFFF"/>
                 </a:solidFill>
               </a14:hiddenFill>
             </a:ext>
             <a:ext uri="{91240B29-F687-4f45-9708-019B960494DF}">
-              <a14:hiddenLine xmlns="" xmlns:a14="http://schemas.microsoft.com/office/drawing/2010/main" w="9525">
+              <a14:hiddenLine xmlns:a14="http://schemas.microsoft.com/office/drawing/2010/main" xmlns="" w="9525">
                 <a:solidFill>
                   <a:srgbClr val="000000"/>
                 </a:solidFill>

</xml_diff>